<commit_message>
Ajout du premier call a l'API dans le projet d'informatique mobile
</commit_message>
<xml_diff>
--- a/LOG8430 - Architecture logicielle et conception avancée/Paper/oral.pptx
+++ b/LOG8430 - Architecture logicielle et conception avancée/Paper/oral.pptx
@@ -131,10 +131,6 @@
 </p:presentation>
 </file>
 
-<file path=ppt/revisionInfo.xml><?xml version="1.0" encoding="utf-8"?>
-<p1510:revInfo xmlns:a="http://schemas.openxmlformats.org/drawingml/2006/main" xmlns:r="http://schemas.openxmlformats.org/officeDocument/2006/relationships" xmlns:p1510="http://schemas.microsoft.com/office/powerpoint/2015/10/main"/>
-</file>
-
 <file path=ppt/notesMasters/notesMaster1.xml><?xml version="1.0" encoding="utf-8"?>
 <p:notesMaster xmlns:a="http://schemas.openxmlformats.org/drawingml/2006/main" xmlns:r="http://schemas.openxmlformats.org/officeDocument/2006/relationships" xmlns:p="http://schemas.openxmlformats.org/presentationml/2006/main">
   <p:cSld>
@@ -217,7 +213,7 @@
           <a:p>
             <a:fld id="{EE63A887-B895-4797-A466-7F682148677D}" type="datetimeFigureOut">
               <a:rPr lang="fr-CA" smtClean="0"/>
-              <a:t>2018-03-18</a:t>
+              <a:t>2018-03-19</a:t>
             </a:fld>
             <a:endParaRPr lang="fr-CA" dirty="0"/>
           </a:p>
@@ -376,7 +372,7 @@
           <a:p>
             <a:fld id="{38270C34-74C1-4047-8DBB-B061C47AB81A}" type="slidenum">
               <a:rPr lang="fr-CA" smtClean="0"/>
-              <a:t>‹N°›</a:t>
+              <a:t>‹#›</a:t>
             </a:fld>
             <a:endParaRPr lang="fr-CA" dirty="0"/>
           </a:p>
@@ -987,7 +983,7 @@
           <a:p>
             <a:fld id="{4AAD347D-5ACD-4C99-B74B-A9C85AD731AF}" type="datetimeFigureOut">
               <a:rPr lang="en-US" smtClean="0"/>
-              <a:t>3/18/2018</a:t>
+              <a:t>3/19/2018</a:t>
             </a:fld>
             <a:endParaRPr lang="en-US" dirty="0"/>
           </a:p>
@@ -1034,7 +1030,7 @@
           <a:p>
             <a:fld id="{D57F1E4F-1CFF-5643-939E-02111984F565}" type="slidenum">
               <a:rPr lang="en-US" smtClean="0"/>
-              <a:t>‹N°›</a:t>
+              <a:t>‹#›</a:t>
             </a:fld>
             <a:endParaRPr lang="en-US" dirty="0"/>
           </a:p>
@@ -1283,7 +1279,7 @@
           <a:p>
             <a:fld id="{4509A250-FF31-4206-8172-F9D3106AACB1}" type="datetimeFigureOut">
               <a:rPr lang="en-US" smtClean="0"/>
-              <a:t>3/18/2018</a:t>
+              <a:t>3/19/2018</a:t>
             </a:fld>
             <a:endParaRPr lang="en-US" dirty="0"/>
           </a:p>
@@ -1325,7 +1321,7 @@
           <a:p>
             <a:fld id="{D57F1E4F-1CFF-5643-939E-02111984F565}" type="slidenum">
               <a:rPr lang="en-US" smtClean="0"/>
-              <a:t>‹N°›</a:t>
+              <a:t>‹#›</a:t>
             </a:fld>
             <a:endParaRPr lang="en-US" dirty="0"/>
           </a:p>
@@ -1531,7 +1527,7 @@
           <a:p>
             <a:fld id="{4509A250-FF31-4206-8172-F9D3106AACB1}" type="datetimeFigureOut">
               <a:rPr lang="en-US" smtClean="0"/>
-              <a:t>3/18/2018</a:t>
+              <a:t>3/19/2018</a:t>
             </a:fld>
             <a:endParaRPr lang="en-US" dirty="0"/>
           </a:p>
@@ -1573,7 +1569,7 @@
           <a:p>
             <a:fld id="{D57F1E4F-1CFF-5643-939E-02111984F565}" type="slidenum">
               <a:rPr lang="en-US" smtClean="0"/>
-              <a:t>‹N°›</a:t>
+              <a:t>‹#›</a:t>
             </a:fld>
             <a:endParaRPr lang="en-US" dirty="0"/>
           </a:p>
@@ -2071,7 +2067,7 @@
           <a:p>
             <a:fld id="{4509A250-FF31-4206-8172-F9D3106AACB1}" type="datetimeFigureOut">
               <a:rPr lang="en-US" smtClean="0"/>
-              <a:t>3/18/2018</a:t>
+              <a:t>3/19/2018</a:t>
             </a:fld>
             <a:endParaRPr lang="en-US" dirty="0"/>
           </a:p>
@@ -2113,7 +2109,7 @@
           <a:p>
             <a:fld id="{D57F1E4F-1CFF-5643-939E-02111984F565}" type="slidenum">
               <a:rPr lang="en-US" smtClean="0"/>
-              <a:t>‹N°›</a:t>
+              <a:t>‹#›</a:t>
             </a:fld>
             <a:endParaRPr lang="en-US" dirty="0"/>
           </a:p>
@@ -2319,7 +2315,7 @@
           <a:p>
             <a:fld id="{4509A250-FF31-4206-8172-F9D3106AACB1}" type="datetimeFigureOut">
               <a:rPr lang="en-US" smtClean="0"/>
-              <a:t>3/18/2018</a:t>
+              <a:t>3/19/2018</a:t>
             </a:fld>
             <a:endParaRPr lang="en-US" dirty="0"/>
           </a:p>
@@ -2361,7 +2357,7 @@
           <a:p>
             <a:fld id="{D57F1E4F-1CFF-5643-939E-02111984F565}" type="slidenum">
               <a:rPr lang="en-US" smtClean="0"/>
-              <a:t>‹N°›</a:t>
+              <a:t>‹#›</a:t>
             </a:fld>
             <a:endParaRPr lang="en-US" dirty="0"/>
           </a:p>
@@ -2851,7 +2847,7 @@
           <a:p>
             <a:fld id="{4AAD347D-5ACD-4C99-B74B-A9C85AD731AF}" type="datetimeFigureOut">
               <a:rPr lang="en-US" smtClean="0"/>
-              <a:t>3/18/2018</a:t>
+              <a:t>3/19/2018</a:t>
             </a:fld>
             <a:endParaRPr lang="en-US" dirty="0"/>
           </a:p>
@@ -2893,7 +2889,7 @@
           <a:p>
             <a:fld id="{D57F1E4F-1CFF-5643-939E-02111984F565}" type="slidenum">
               <a:rPr lang="en-US" smtClean="0"/>
-              <a:t>‹N°›</a:t>
+              <a:t>‹#›</a:t>
             </a:fld>
             <a:endParaRPr lang="en-US" dirty="0"/>
           </a:p>
@@ -3149,7 +3145,7 @@
           <a:p>
             <a:fld id="{4AAD347D-5ACD-4C99-B74B-A9C85AD731AF}" type="datetimeFigureOut">
               <a:rPr lang="en-US" smtClean="0"/>
-              <a:t>3/18/2018</a:t>
+              <a:t>3/19/2018</a:t>
             </a:fld>
             <a:endParaRPr lang="en-US" dirty="0"/>
           </a:p>
@@ -3191,7 +3187,7 @@
           <a:p>
             <a:fld id="{D57F1E4F-1CFF-5643-939E-02111984F565}" type="slidenum">
               <a:rPr lang="en-US" smtClean="0"/>
-              <a:t>‹N°›</a:t>
+              <a:t>‹#›</a:t>
             </a:fld>
             <a:endParaRPr lang="en-US" dirty="0"/>
           </a:p>
@@ -3324,7 +3320,7 @@
           <a:p>
             <a:fld id="{4509A250-FF31-4206-8172-F9D3106AACB1}" type="datetimeFigureOut">
               <a:rPr lang="en-US" smtClean="0"/>
-              <a:t>3/18/2018</a:t>
+              <a:t>3/19/2018</a:t>
             </a:fld>
             <a:endParaRPr lang="en-US" dirty="0"/>
           </a:p>
@@ -3366,7 +3362,7 @@
           <a:p>
             <a:fld id="{D57F1E4F-1CFF-5643-939E-02111984F565}" type="slidenum">
               <a:rPr lang="en-US" smtClean="0"/>
-              <a:t>‹N°›</a:t>
+              <a:t>‹#›</a:t>
             </a:fld>
             <a:endParaRPr lang="en-US" dirty="0"/>
           </a:p>
@@ -3504,7 +3500,7 @@
           <a:p>
             <a:fld id="{4509A250-FF31-4206-8172-F9D3106AACB1}" type="datetimeFigureOut">
               <a:rPr lang="en-US" smtClean="0"/>
-              <a:t>3/18/2018</a:t>
+              <a:t>3/19/2018</a:t>
             </a:fld>
             <a:endParaRPr lang="en-US" dirty="0"/>
           </a:p>
@@ -3546,7 +3542,7 @@
           <a:p>
             <a:fld id="{D57F1E4F-1CFF-5643-939E-02111984F565}" type="slidenum">
               <a:rPr lang="en-US" smtClean="0"/>
-              <a:t>‹N°›</a:t>
+              <a:t>‹#›</a:t>
             </a:fld>
             <a:endParaRPr lang="en-US" dirty="0"/>
           </a:p>
@@ -3674,7 +3670,7 @@
           <a:p>
             <a:fld id="{4509A250-FF31-4206-8172-F9D3106AACB1}" type="datetimeFigureOut">
               <a:rPr lang="en-US" smtClean="0"/>
-              <a:t>3/18/2018</a:t>
+              <a:t>3/19/2018</a:t>
             </a:fld>
             <a:endParaRPr lang="en-US" dirty="0"/>
           </a:p>
@@ -3721,7 +3717,7 @@
           <a:p>
             <a:fld id="{D57F1E4F-1CFF-5643-939E-02111984F565}" type="slidenum">
               <a:rPr lang="en-US" smtClean="0"/>
-              <a:t>‹N°›</a:t>
+              <a:t>‹#›</a:t>
             </a:fld>
             <a:endParaRPr lang="en-US" dirty="0"/>
           </a:p>
@@ -3925,7 +3921,7 @@
           <a:p>
             <a:fld id="{9796027F-7875-4030-9381-8BD8C4F21935}" type="datetimeFigureOut">
               <a:rPr lang="en-US" smtClean="0"/>
-              <a:t>3/18/2018</a:t>
+              <a:t>3/19/2018</a:t>
             </a:fld>
             <a:endParaRPr lang="en-US" dirty="0"/>
           </a:p>
@@ -3967,7 +3963,7 @@
           <a:p>
             <a:fld id="{D57F1E4F-1CFF-5643-939E-02111984F565}" type="slidenum">
               <a:rPr lang="en-US" smtClean="0"/>
-              <a:t>‹N°›</a:t>
+              <a:t>‹#›</a:t>
             </a:fld>
             <a:endParaRPr lang="en-US" dirty="0"/>
           </a:p>
@@ -4222,7 +4218,7 @@
           <a:p>
             <a:fld id="{9796027F-7875-4030-9381-8BD8C4F21935}" type="datetimeFigureOut">
               <a:rPr lang="en-US" smtClean="0"/>
-              <a:t>3/18/2018</a:t>
+              <a:t>3/19/2018</a:t>
             </a:fld>
             <a:endParaRPr lang="en-US" dirty="0"/>
           </a:p>
@@ -4264,7 +4260,7 @@
           <a:p>
             <a:fld id="{D57F1E4F-1CFF-5643-939E-02111984F565}" type="slidenum">
               <a:rPr lang="en-US" smtClean="0"/>
-              <a:t>‹N°›</a:t>
+              <a:t>‹#›</a:t>
             </a:fld>
             <a:endParaRPr lang="en-US" dirty="0"/>
           </a:p>
@@ -4664,7 +4660,7 @@
           <a:p>
             <a:fld id="{9796027F-7875-4030-9381-8BD8C4F21935}" type="datetimeFigureOut">
               <a:rPr lang="en-US" smtClean="0"/>
-              <a:t>3/18/2018</a:t>
+              <a:t>3/19/2018</a:t>
             </a:fld>
             <a:endParaRPr lang="en-US" dirty="0"/>
           </a:p>
@@ -4706,7 +4702,7 @@
           <a:p>
             <a:fld id="{D57F1E4F-1CFF-5643-939E-02111984F565}" type="slidenum">
               <a:rPr lang="en-US" smtClean="0"/>
-              <a:t>‹N°›</a:t>
+              <a:t>‹#›</a:t>
             </a:fld>
             <a:endParaRPr lang="en-US" dirty="0"/>
           </a:p>
@@ -4782,7 +4778,7 @@
           <a:p>
             <a:fld id="{4509A250-FF31-4206-8172-F9D3106AACB1}" type="datetimeFigureOut">
               <a:rPr lang="en-US" smtClean="0"/>
-              <a:t>3/18/2018</a:t>
+              <a:t>3/19/2018</a:t>
             </a:fld>
             <a:endParaRPr lang="en-US" dirty="0"/>
           </a:p>
@@ -4824,7 +4820,7 @@
           <a:p>
             <a:fld id="{D57F1E4F-1CFF-5643-939E-02111984F565}" type="slidenum">
               <a:rPr lang="en-US" smtClean="0"/>
-              <a:t>‹N°›</a:t>
+              <a:t>‹#›</a:t>
             </a:fld>
             <a:endParaRPr lang="en-US" dirty="0"/>
           </a:p>
@@ -4877,7 +4873,7 @@
           <a:p>
             <a:fld id="{4509A250-FF31-4206-8172-F9D3106AACB1}" type="datetimeFigureOut">
               <a:rPr lang="en-US" smtClean="0"/>
-              <a:t>3/18/2018</a:t>
+              <a:t>3/19/2018</a:t>
             </a:fld>
             <a:endParaRPr lang="en-US" dirty="0"/>
           </a:p>
@@ -4919,7 +4915,7 @@
           <a:p>
             <a:fld id="{D57F1E4F-1CFF-5643-939E-02111984F565}" type="slidenum">
               <a:rPr lang="en-US" smtClean="0"/>
-              <a:t>‹N°›</a:t>
+              <a:t>‹#›</a:t>
             </a:fld>
             <a:endParaRPr lang="en-US" dirty="0"/>
           </a:p>
@@ -5160,7 +5156,7 @@
           <a:p>
             <a:fld id="{4509A250-FF31-4206-8172-F9D3106AACB1}" type="datetimeFigureOut">
               <a:rPr lang="en-US" smtClean="0"/>
-              <a:t>3/18/2018</a:t>
+              <a:t>3/19/2018</a:t>
             </a:fld>
             <a:endParaRPr lang="en-US" dirty="0"/>
           </a:p>
@@ -5202,7 +5198,7 @@
           <a:p>
             <a:fld id="{D57F1E4F-1CFF-5643-939E-02111984F565}" type="slidenum">
               <a:rPr lang="en-US" smtClean="0"/>
-              <a:t>‹N°›</a:t>
+              <a:t>‹#›</a:t>
             </a:fld>
             <a:endParaRPr lang="en-US" dirty="0"/>
           </a:p>
@@ -5451,7 +5447,7 @@
           <a:p>
             <a:fld id="{4509A250-FF31-4206-8172-F9D3106AACB1}" type="datetimeFigureOut">
               <a:rPr lang="en-US" smtClean="0"/>
-              <a:t>3/18/2018</a:t>
+              <a:t>3/19/2018</a:t>
             </a:fld>
             <a:endParaRPr lang="en-US" dirty="0"/>
           </a:p>
@@ -5493,7 +5489,7 @@
           <a:p>
             <a:fld id="{D57F1E4F-1CFF-5643-939E-02111984F565}" type="slidenum">
               <a:rPr lang="en-US" smtClean="0"/>
-              <a:t>‹N°›</a:t>
+              <a:t>‹#›</a:t>
             </a:fld>
             <a:endParaRPr lang="en-US" dirty="0"/>
           </a:p>
@@ -5981,7 +5977,7 @@
           <a:p>
             <a:fld id="{4AAD347D-5ACD-4C99-B74B-A9C85AD731AF}" type="datetimeFigureOut">
               <a:rPr lang="en-US" smtClean="0"/>
-              <a:t>3/18/2018</a:t>
+              <a:t>3/19/2018</a:t>
             </a:fld>
             <a:endParaRPr lang="en-US" dirty="0"/>
           </a:p>
@@ -6059,7 +6055,7 @@
           <a:p>
             <a:fld id="{D57F1E4F-1CFF-5643-939E-02111984F565}" type="slidenum">
               <a:rPr lang="en-US" smtClean="0"/>
-              <a:t>‹N°›</a:t>
+              <a:t>‹#›</a:t>
             </a:fld>
             <a:endParaRPr lang="en-US" dirty="0"/>
           </a:p>
@@ -15611,8 +15607,13 @@
             </a:r>
             <a:r>
               <a:rPr lang="en-CA" dirty="0"/>
-              <a:t> le risqué</a:t>
-            </a:r>
+              <a:t> le </a:t>
+            </a:r>
+            <a:r>
+              <a:rPr lang="en-CA"/>
+              <a:t>risque</a:t>
+            </a:r>
+            <a:endParaRPr lang="en-CA" dirty="0"/>
           </a:p>
           <a:p>
             <a:pPr marL="0" indent="0">

</xml_diff>